<commit_message>
COMP220 Week 7 material
</commit_message>
<xml_diff>
--- a/COMP220/07/diagrams.pptx
+++ b/COMP220/07/diagrams.pptx
@@ -117,10 +117,6 @@
 </p:presentation>
 </file>
 
-<file path=ppt/revisionInfo.xml><?xml version="1.0" encoding="utf-8"?>
-<p1510:revInfo xmlns:a="http://schemas.openxmlformats.org/drawingml/2006/main" xmlns:r="http://schemas.openxmlformats.org/officeDocument/2006/relationships" xmlns:p1510="http://schemas.microsoft.com/office/powerpoint/2015/10/main"/>
-</file>
-
 <file path=ppt/slideLayouts/slideLayout1.xml><?xml version="1.0" encoding="utf-8"?>
 <p:sldLayout xmlns:a="http://schemas.openxmlformats.org/drawingml/2006/main" xmlns:r="http://schemas.openxmlformats.org/officeDocument/2006/relationships" xmlns:p="http://schemas.openxmlformats.org/presentationml/2006/main" type="title" preserve="1">
   <p:cSld name="Title Slide">
@@ -252,7 +248,7 @@
           <a:p>
             <a:fld id="{142FDCEA-43C2-48DF-9458-58BC755CEFE0}" type="datetimeFigureOut">
               <a:rPr lang="en-GB" smtClean="0"/>
-              <a:t>05/11/2017</a:t>
+              <a:t>01/03/2021</a:t>
             </a:fld>
             <a:endParaRPr lang="en-GB"/>
           </a:p>
@@ -422,7 +418,7 @@
           <a:p>
             <a:fld id="{142FDCEA-43C2-48DF-9458-58BC755CEFE0}" type="datetimeFigureOut">
               <a:rPr lang="en-GB" smtClean="0"/>
-              <a:t>05/11/2017</a:t>
+              <a:t>01/03/2021</a:t>
             </a:fld>
             <a:endParaRPr lang="en-GB"/>
           </a:p>
@@ -602,7 +598,7 @@
           <a:p>
             <a:fld id="{142FDCEA-43C2-48DF-9458-58BC755CEFE0}" type="datetimeFigureOut">
               <a:rPr lang="en-GB" smtClean="0"/>
-              <a:t>05/11/2017</a:t>
+              <a:t>01/03/2021</a:t>
             </a:fld>
             <a:endParaRPr lang="en-GB"/>
           </a:p>
@@ -772,7 +768,7 @@
           <a:p>
             <a:fld id="{142FDCEA-43C2-48DF-9458-58BC755CEFE0}" type="datetimeFigureOut">
               <a:rPr lang="en-GB" smtClean="0"/>
-              <a:t>05/11/2017</a:t>
+              <a:t>01/03/2021</a:t>
             </a:fld>
             <a:endParaRPr lang="en-GB"/>
           </a:p>
@@ -1018,7 +1014,7 @@
           <a:p>
             <a:fld id="{142FDCEA-43C2-48DF-9458-58BC755CEFE0}" type="datetimeFigureOut">
               <a:rPr lang="en-GB" smtClean="0"/>
-              <a:t>05/11/2017</a:t>
+              <a:t>01/03/2021</a:t>
             </a:fld>
             <a:endParaRPr lang="en-GB"/>
           </a:p>
@@ -1250,7 +1246,7 @@
           <a:p>
             <a:fld id="{142FDCEA-43C2-48DF-9458-58BC755CEFE0}" type="datetimeFigureOut">
               <a:rPr lang="en-GB" smtClean="0"/>
-              <a:t>05/11/2017</a:t>
+              <a:t>01/03/2021</a:t>
             </a:fld>
             <a:endParaRPr lang="en-GB"/>
           </a:p>
@@ -1617,7 +1613,7 @@
           <a:p>
             <a:fld id="{142FDCEA-43C2-48DF-9458-58BC755CEFE0}" type="datetimeFigureOut">
               <a:rPr lang="en-GB" smtClean="0"/>
-              <a:t>05/11/2017</a:t>
+              <a:t>01/03/2021</a:t>
             </a:fld>
             <a:endParaRPr lang="en-GB"/>
           </a:p>
@@ -1735,7 +1731,7 @@
           <a:p>
             <a:fld id="{142FDCEA-43C2-48DF-9458-58BC755CEFE0}" type="datetimeFigureOut">
               <a:rPr lang="en-GB" smtClean="0"/>
-              <a:t>05/11/2017</a:t>
+              <a:t>01/03/2021</a:t>
             </a:fld>
             <a:endParaRPr lang="en-GB"/>
           </a:p>
@@ -1830,7 +1826,7 @@
           <a:p>
             <a:fld id="{142FDCEA-43C2-48DF-9458-58BC755CEFE0}" type="datetimeFigureOut">
               <a:rPr lang="en-GB" smtClean="0"/>
-              <a:t>05/11/2017</a:t>
+              <a:t>01/03/2021</a:t>
             </a:fld>
             <a:endParaRPr lang="en-GB"/>
           </a:p>
@@ -2107,7 +2103,7 @@
           <a:p>
             <a:fld id="{142FDCEA-43C2-48DF-9458-58BC755CEFE0}" type="datetimeFigureOut">
               <a:rPr lang="en-GB" smtClean="0"/>
-              <a:t>05/11/2017</a:t>
+              <a:t>01/03/2021</a:t>
             </a:fld>
             <a:endParaRPr lang="en-GB"/>
           </a:p>
@@ -2360,7 +2356,7 @@
           <a:p>
             <a:fld id="{142FDCEA-43C2-48DF-9458-58BC755CEFE0}" type="datetimeFigureOut">
               <a:rPr lang="en-GB" smtClean="0"/>
-              <a:t>05/11/2017</a:t>
+              <a:t>01/03/2021</a:t>
             </a:fld>
             <a:endParaRPr lang="en-GB"/>
           </a:p>
@@ -2573,7 +2569,7 @@
           <a:p>
             <a:fld id="{142FDCEA-43C2-48DF-9458-58BC755CEFE0}" type="datetimeFigureOut">
               <a:rPr lang="en-GB" smtClean="0"/>
-              <a:t>05/11/2017</a:t>
+              <a:t>01/03/2021</a:t>
             </a:fld>
             <a:endParaRPr lang="en-GB"/>
           </a:p>
@@ -4606,7 +4602,7 @@
         </p:nvSpPr>
         <p:spPr>
           <a:xfrm>
-            <a:off x="3086100" y="596900"/>
+            <a:off x="3306649" y="614929"/>
             <a:ext cx="914400" cy="914400"/>
           </a:xfrm>
           <a:prstGeom prst="sun">
@@ -4682,13 +4678,15 @@
       <p:cxnSp>
         <p:nvCxnSpPr>
           <p:cNvPr id="8" name="Straight Arrow Connector 7"/>
-          <p:cNvCxnSpPr/>
+          <p:cNvCxnSpPr>
+            <a:cxnSpLocks/>
+          </p:cNvCxnSpPr>
           <p:nvPr/>
         </p:nvCxnSpPr>
         <p:spPr>
           <a:xfrm flipH="1" flipV="1">
-            <a:off x="4095750" y="1836013"/>
-            <a:ext cx="444501" cy="621437"/>
+            <a:off x="4203186" y="1831643"/>
+            <a:ext cx="337066" cy="625808"/>
           </a:xfrm>
           <a:prstGeom prst="straightConnector1">
             <a:avLst/>
@@ -4725,8 +4723,8 @@
           </a:xfrm>
           <a:prstGeom prst="arc">
             <a:avLst>
-              <a:gd name="adj1" fmla="val 14019153"/>
-              <a:gd name="adj2" fmla="val 18321087"/>
+              <a:gd name="adj1" fmla="val 16198469"/>
+              <a:gd name="adj2" fmla="val 17798678"/>
             </a:avLst>
           </a:prstGeom>
         </p:spPr>
@@ -4755,14 +4753,14 @@
       </p:sp>
       <p:sp>
         <p:nvSpPr>
-          <p:cNvPr id="17" name="TextBox 16"/>
+          <p:cNvPr id="23" name="TextBox 22"/>
           <p:cNvSpPr txBox="1"/>
           <p:nvPr/>
         </p:nvSpPr>
         <p:spPr>
           <a:xfrm>
-            <a:off x="4279900" y="1903453"/>
-            <a:ext cx="308098" cy="369332"/>
+            <a:off x="4312083" y="1381129"/>
+            <a:ext cx="306494" cy="369332"/>
           </a:xfrm>
           <a:prstGeom prst="rect">
             <a:avLst/>
@@ -4776,23 +4774,22 @@
           <a:lstStyle/>
           <a:p>
             <a:r>
-              <a:rPr lang="el-GR" dirty="0"/>
-              <a:t>θ</a:t>
-            </a:r>
-            <a:endParaRPr lang="en-GB" dirty="0"/>
-          </a:p>
-        </p:txBody>
-      </p:sp>
-      <p:sp>
-        <p:nvSpPr>
-          <p:cNvPr id="23" name="TextBox 22"/>
+              <a:rPr lang="en-GB" dirty="0"/>
+              <a:t>n</a:t>
+            </a:r>
+          </a:p>
+        </p:txBody>
+      </p:sp>
+      <p:sp>
+        <p:nvSpPr>
+          <p:cNvPr id="24" name="TextBox 23"/>
           <p:cNvSpPr txBox="1"/>
           <p:nvPr/>
         </p:nvSpPr>
         <p:spPr>
           <a:xfrm>
-            <a:off x="4489450" y="1462311"/>
-            <a:ext cx="306494" cy="369332"/>
+            <a:off x="3930548" y="1612831"/>
+            <a:ext cx="237566" cy="369332"/>
           </a:xfrm>
           <a:prstGeom prst="rect">
             <a:avLst/>
@@ -4806,22 +4803,23 @@
           <a:lstStyle/>
           <a:p>
             <a:r>
-              <a:rPr lang="en-GB" dirty="0"/>
-              <a:t>n</a:t>
-            </a:r>
-          </a:p>
-        </p:txBody>
-      </p:sp>
-      <p:sp>
-        <p:nvSpPr>
-          <p:cNvPr id="24" name="TextBox 23"/>
+              <a:rPr lang="en-GB" dirty="0" err="1"/>
+              <a:t>i</a:t>
+            </a:r>
+            <a:endParaRPr lang="en-GB" dirty="0"/>
+          </a:p>
+        </p:txBody>
+      </p:sp>
+      <p:sp>
+        <p:nvSpPr>
+          <p:cNvPr id="18" name="TextBox 17"/>
           <p:cNvSpPr txBox="1"/>
           <p:nvPr/>
         </p:nvSpPr>
         <p:spPr>
           <a:xfrm>
-            <a:off x="3881717" y="1670913"/>
-            <a:ext cx="237566" cy="369332"/>
+            <a:off x="4470106" y="1838764"/>
+            <a:ext cx="308098" cy="369332"/>
           </a:xfrm>
           <a:prstGeom prst="rect">
             <a:avLst/>
@@ -4835,56 +4833,23 @@
           <a:lstStyle/>
           <a:p>
             <a:r>
-              <a:rPr lang="en-GB" dirty="0" err="1"/>
-              <a:t>i</a:t>
+              <a:rPr lang="el-GR" dirty="0"/>
+              <a:t>θ</a:t>
             </a:r>
             <a:endParaRPr lang="en-GB" dirty="0"/>
           </a:p>
         </p:txBody>
       </p:sp>
-      <p:cxnSp>
-        <p:nvCxnSpPr>
-          <p:cNvPr id="15" name="Straight Arrow Connector 14"/>
-          <p:cNvCxnSpPr/>
-          <p:nvPr/>
-        </p:nvCxnSpPr>
-        <p:spPr>
-          <a:xfrm flipV="1">
-            <a:off x="4540251" y="1855579"/>
-            <a:ext cx="408267" cy="605729"/>
-          </a:xfrm>
-          <a:prstGeom prst="straightConnector1">
-            <a:avLst/>
-          </a:prstGeom>
-          <a:ln>
-            <a:tailEnd type="triangle"/>
-          </a:ln>
-        </p:spPr>
-        <p:style>
-          <a:lnRef idx="1">
-            <a:schemeClr val="accent1"/>
-          </a:lnRef>
-          <a:fillRef idx="0">
-            <a:schemeClr val="accent1"/>
-          </a:fillRef>
-          <a:effectRef idx="0">
-            <a:schemeClr val="accent1"/>
-          </a:effectRef>
-          <a:fontRef idx="minor">
-            <a:schemeClr val="tx1"/>
-          </a:fontRef>
-        </p:style>
-      </p:cxnSp>
-      <p:sp>
-        <p:nvSpPr>
-          <p:cNvPr id="18" name="TextBox 17"/>
+      <p:sp>
+        <p:nvSpPr>
+          <p:cNvPr id="19" name="TextBox 18"/>
           <p:cNvSpPr txBox="1"/>
           <p:nvPr/>
         </p:nvSpPr>
         <p:spPr>
           <a:xfrm>
-            <a:off x="4489450" y="1951327"/>
-            <a:ext cx="308098" cy="369332"/>
+            <a:off x="4769275" y="1455752"/>
+            <a:ext cx="306494" cy="369332"/>
           </a:xfrm>
           <a:prstGeom prst="rect">
             <a:avLst/>
@@ -4898,36 +4863,6 @@
           <a:lstStyle/>
           <a:p>
             <a:r>
-              <a:rPr lang="el-GR" dirty="0"/>
-              <a:t>θ</a:t>
-            </a:r>
-            <a:endParaRPr lang="en-GB" dirty="0"/>
-          </a:p>
-        </p:txBody>
-      </p:sp>
-      <p:sp>
-        <p:nvSpPr>
-          <p:cNvPr id="19" name="TextBox 18"/>
-          <p:cNvSpPr txBox="1"/>
-          <p:nvPr/>
-        </p:nvSpPr>
-        <p:spPr>
-          <a:xfrm>
-            <a:off x="4800426" y="1558059"/>
-            <a:ext cx="306494" cy="369332"/>
-          </a:xfrm>
-          <a:prstGeom prst="rect">
-            <a:avLst/>
-          </a:prstGeom>
-          <a:noFill/>
-        </p:spPr>
-        <p:txBody>
-          <a:bodyPr wrap="none" rtlCol="0">
-            <a:spAutoFit/>
-          </a:bodyPr>
-          <a:lstStyle/>
-          <a:p>
-            <a:r>
               <a:rPr lang="en-GB" dirty="0"/>
               <a:t>h</a:t>
             </a:r>
@@ -4937,13 +4872,15 @@
       <p:cxnSp>
         <p:nvCxnSpPr>
           <p:cNvPr id="20" name="Straight Arrow Connector 19"/>
-          <p:cNvCxnSpPr/>
+          <p:cNvCxnSpPr>
+            <a:cxnSpLocks/>
+          </p:cNvCxnSpPr>
           <p:nvPr/>
         </p:nvCxnSpPr>
         <p:spPr>
           <a:xfrm flipV="1">
-            <a:off x="4535768" y="1903453"/>
-            <a:ext cx="630343" cy="557858"/>
+            <a:off x="4535768" y="1876207"/>
+            <a:ext cx="830250" cy="585104"/>
           </a:xfrm>
           <a:prstGeom prst="straightConnector1">
             <a:avLst/>
@@ -4979,8 +4916,8 @@
           <p:nvPr/>
         </p:nvGrpSpPr>
         <p:grpSpPr>
-          <a:xfrm rot="19201413">
-            <a:off x="5334294" y="1328975"/>
+          <a:xfrm rot="19481002">
+            <a:off x="5359358" y="1505412"/>
             <a:ext cx="709613" cy="285751"/>
             <a:chOff x="5576887" y="939800"/>
             <a:chExt cx="709613" cy="285751"/>
@@ -5101,7 +5038,7 @@
         </p:nvSpPr>
         <p:spPr>
           <a:xfrm>
-            <a:off x="5101493" y="1831643"/>
+            <a:off x="5192016" y="1861022"/>
             <a:ext cx="300082" cy="369332"/>
           </a:xfrm>
           <a:prstGeom prst="rect">
@@ -5116,13 +5053,53 @@
           <a:lstStyle/>
           <a:p>
             <a:r>
-              <a:rPr lang="en-GB" dirty="0" err="1"/>
-              <a:t>e</a:t>
-            </a:r>
-            <a:endParaRPr lang="en-GB" dirty="0"/>
-          </a:p>
-        </p:txBody>
-      </p:sp>
+              <a:rPr lang="en-GB" dirty="0"/>
+              <a:t>v</a:t>
+            </a:r>
+          </a:p>
+        </p:txBody>
+      </p:sp>
+      <p:cxnSp>
+        <p:nvCxnSpPr>
+          <p:cNvPr id="29" name="Straight Arrow Connector 28">
+            <a:extLst>
+              <a:ext uri="{FF2B5EF4-FFF2-40B4-BE49-F238E27FC236}">
+                <a16:creationId xmlns:a16="http://schemas.microsoft.com/office/drawing/2014/main" id="{38A853AB-8357-40BE-AE45-EC9065C7A306}"/>
+              </a:ext>
+            </a:extLst>
+          </p:cNvPr>
+          <p:cNvCxnSpPr>
+            <a:cxnSpLocks/>
+          </p:cNvCxnSpPr>
+          <p:nvPr/>
+        </p:nvCxnSpPr>
+        <p:spPr>
+          <a:xfrm flipV="1">
+            <a:off x="4528615" y="1713406"/>
+            <a:ext cx="307045" cy="771446"/>
+          </a:xfrm>
+          <a:prstGeom prst="straightConnector1">
+            <a:avLst/>
+          </a:prstGeom>
+          <a:ln>
+            <a:tailEnd type="triangle"/>
+          </a:ln>
+        </p:spPr>
+        <p:style>
+          <a:lnRef idx="1">
+            <a:schemeClr val="accent1"/>
+          </a:lnRef>
+          <a:fillRef idx="0">
+            <a:schemeClr val="accent1"/>
+          </a:fillRef>
+          <a:effectRef idx="0">
+            <a:schemeClr val="accent1"/>
+          </a:effectRef>
+          <a:fontRef idx="minor">
+            <a:schemeClr val="tx1"/>
+          </a:fontRef>
+        </p:style>
+      </p:cxnSp>
     </p:spTree>
     <p:extLst>
       <p:ext uri="{BB962C8B-B14F-4D97-AF65-F5344CB8AC3E}">

</xml_diff>